<commit_message>
Youtube URLs added. Page publish
</commit_message>
<xml_diff>
--- a/GAB2021_Wriju.pptx
+++ b/GAB2021_Wriju.pptx
@@ -106,13 +106,18 @@
       </a:defRPr>
     </a:lvl9pPr>
   </p:defaultTextStyle>
+  <p:extLst>
+    <p:ext uri="{EFAFB233-063F-42B5-8137-9DF3F51BA10A}">
+      <p15:sldGuideLst xmlns:p15="http://schemas.microsoft.com/office/powerpoint/2012/main"/>
+    </p:ext>
+  </p:extLst>
 </p:presentation>
 </file>
 
 <file path=ppt/revisionInfo.xml><?xml version="1.0" encoding="utf-8"?>
 <p1510:revInfo xmlns:a="http://schemas.openxmlformats.org/drawingml/2006/main" xmlns:r="http://schemas.openxmlformats.org/officeDocument/2006/relationships" xmlns:p1510="http://schemas.microsoft.com/office/powerpoint/2015/10/main">
   <p1510:revLst>
-    <p1510:client id="{FED53AF1-3644-4234-9F3E-BD821256C930}" v="1" dt="2021-04-12T14:29:06.165"/>
+    <p1510:client id="{FED53AF1-3644-4234-9F3E-BD821256C930}" v="6" dt="2021-04-13T16:52:56.830"/>
   </p1510:revLst>
 </p1510:revInfo>
 </file>
@@ -121,20 +126,51 @@
 <pc:chgInfo xmlns:a="http://schemas.openxmlformats.org/drawingml/2006/main" xmlns:r="http://schemas.openxmlformats.org/officeDocument/2006/relationships" xmlns:ac="http://schemas.microsoft.com/office/drawing/2013/main/command" xmlns:pc="http://schemas.microsoft.com/office/powerpoint/2013/main/command">
   <pc:docChgLst>
     <pc:chgData name="Wriju Ghosh" userId="93330360-ec5c-4afd-b5e4-d283febfe7a2" providerId="ADAL" clId="{FED53AF1-3644-4234-9F3E-BD821256C930}"/>
-    <pc:docChg chg="addSld modSld">
-      <pc:chgData name="Wriju Ghosh" userId="93330360-ec5c-4afd-b5e4-d283febfe7a2" providerId="ADAL" clId="{FED53AF1-3644-4234-9F3E-BD821256C930}" dt="2021-04-12T14:29:07.779" v="37" actId="20577"/>
+    <pc:docChg chg="undo custSel addSld delSld modSld">
+      <pc:chgData name="Wriju Ghosh" userId="93330360-ec5c-4afd-b5e4-d283febfe7a2" providerId="ADAL" clId="{FED53AF1-3644-4234-9F3E-BD821256C930}" dt="2021-04-13T16:52:56.823" v="451" actId="20577"/>
       <pc:docMkLst>
         <pc:docMk/>
       </pc:docMkLst>
-      <pc:sldChg chg="new">
-        <pc:chgData name="Wriju Ghosh" userId="93330360-ec5c-4afd-b5e4-d283febfe7a2" providerId="ADAL" clId="{FED53AF1-3644-4234-9F3E-BD821256C930}" dt="2021-04-12T14:27:50.014" v="0" actId="680"/>
+      <pc:sldChg chg="addSp delSp mod">
+        <pc:chgData name="Wriju Ghosh" userId="93330360-ec5c-4afd-b5e4-d283febfe7a2" providerId="ADAL" clId="{FED53AF1-3644-4234-9F3E-BD821256C930}" dt="2021-04-13T10:00:50.082" v="39" actId="22"/>
+        <pc:sldMkLst>
+          <pc:docMk/>
+          <pc:sldMk cId="3700827239" sldId="256"/>
+        </pc:sldMkLst>
+        <pc:spChg chg="add del">
+          <ac:chgData name="Wriju Ghosh" userId="93330360-ec5c-4afd-b5e4-d283febfe7a2" providerId="ADAL" clId="{FED53AF1-3644-4234-9F3E-BD821256C930}" dt="2021-04-13T10:00:50.082" v="39" actId="22"/>
+          <ac:spMkLst>
+            <pc:docMk/>
+            <pc:sldMk cId="3700827239" sldId="256"/>
+            <ac:spMk id="10" creationId="{5BEDF7DD-4718-4316-BEBB-8BAE94CDDF1A}"/>
+          </ac:spMkLst>
+        </pc:spChg>
+      </pc:sldChg>
+      <pc:sldChg chg="modSp new mod modAnim">
+        <pc:chgData name="Wriju Ghosh" userId="93330360-ec5c-4afd-b5e4-d283febfe7a2" providerId="ADAL" clId="{FED53AF1-3644-4234-9F3E-BD821256C930}" dt="2021-04-13T13:23:06.141" v="441"/>
         <pc:sldMkLst>
           <pc:docMk/>
           <pc:sldMk cId="234700112" sldId="257"/>
         </pc:sldMkLst>
+        <pc:spChg chg="mod">
+          <ac:chgData name="Wriju Ghosh" userId="93330360-ec5c-4afd-b5e4-d283febfe7a2" providerId="ADAL" clId="{FED53AF1-3644-4234-9F3E-BD821256C930}" dt="2021-04-13T13:21:56.416" v="292" actId="20577"/>
+          <ac:spMkLst>
+            <pc:docMk/>
+            <pc:sldMk cId="234700112" sldId="257"/>
+            <ac:spMk id="2" creationId="{2E6BC251-72AF-4437-B971-C24D2291D830}"/>
+          </ac:spMkLst>
+        </pc:spChg>
+        <pc:spChg chg="mod">
+          <ac:chgData name="Wriju Ghosh" userId="93330360-ec5c-4afd-b5e4-d283febfe7a2" providerId="ADAL" clId="{FED53AF1-3644-4234-9F3E-BD821256C930}" dt="2021-04-13T13:22:54.085" v="440" actId="20577"/>
+          <ac:spMkLst>
+            <pc:docMk/>
+            <pc:sldMk cId="234700112" sldId="257"/>
+            <ac:spMk id="3" creationId="{07EF0A40-9F21-49B9-A00F-6512BD6336D3}"/>
+          </ac:spMkLst>
+        </pc:spChg>
       </pc:sldChg>
       <pc:sldChg chg="modSp new mod">
-        <pc:chgData name="Wriju Ghosh" userId="93330360-ec5c-4afd-b5e4-d283febfe7a2" providerId="ADAL" clId="{FED53AF1-3644-4234-9F3E-BD821256C930}" dt="2021-04-12T14:29:07.779" v="37" actId="20577"/>
+        <pc:chgData name="Wriju Ghosh" userId="93330360-ec5c-4afd-b5e4-d283febfe7a2" providerId="ADAL" clId="{FED53AF1-3644-4234-9F3E-BD821256C930}" dt="2021-04-13T16:52:56.823" v="451" actId="20577"/>
         <pc:sldMkLst>
           <pc:docMk/>
           <pc:sldMk cId="1821724153" sldId="258"/>
@@ -148,13 +184,43 @@
           </ac:spMkLst>
         </pc:spChg>
         <pc:spChg chg="mod">
-          <ac:chgData name="Wriju Ghosh" userId="93330360-ec5c-4afd-b5e4-d283febfe7a2" providerId="ADAL" clId="{FED53AF1-3644-4234-9F3E-BD821256C930}" dt="2021-04-12T14:29:07.779" v="37" actId="20577"/>
+          <ac:chgData name="Wriju Ghosh" userId="93330360-ec5c-4afd-b5e4-d283febfe7a2" providerId="ADAL" clId="{FED53AF1-3644-4234-9F3E-BD821256C930}" dt="2021-04-13T16:52:56.823" v="451" actId="20577"/>
           <ac:spMkLst>
             <pc:docMk/>
             <pc:sldMk cId="1821724153" sldId="258"/>
             <ac:spMk id="3" creationId="{FFE432CE-0A07-4158-8390-09FC9A4A64CB}"/>
           </ac:spMkLst>
         </pc:spChg>
+      </pc:sldChg>
+      <pc:sldChg chg="modSp del mod">
+        <pc:chgData name="Wriju Ghosh" userId="93330360-ec5c-4afd-b5e4-d283febfe7a2" providerId="ADAL" clId="{FED53AF1-3644-4234-9F3E-BD821256C930}" dt="2021-04-13T13:23:12.977" v="442" actId="47"/>
+        <pc:sldMkLst>
+          <pc:docMk/>
+          <pc:sldMk cId="1192821646" sldId="259"/>
+        </pc:sldMkLst>
+        <pc:spChg chg="mod">
+          <ac:chgData name="Wriju Ghosh" userId="93330360-ec5c-4afd-b5e4-d283febfe7a2" providerId="ADAL" clId="{FED53AF1-3644-4234-9F3E-BD821256C930}" dt="2021-04-13T11:10:25.321" v="283" actId="20577"/>
+          <ac:spMkLst>
+            <pc:docMk/>
+            <pc:sldMk cId="1192821646" sldId="259"/>
+            <ac:spMk id="2" creationId="{F3F55F88-B991-4125-818A-073A5104BDF7}"/>
+          </ac:spMkLst>
+        </pc:spChg>
+        <pc:spChg chg="mod">
+          <ac:chgData name="Wriju Ghosh" userId="93330360-ec5c-4afd-b5e4-d283febfe7a2" providerId="ADAL" clId="{FED53AF1-3644-4234-9F3E-BD821256C930}" dt="2021-04-13T10:02:01.103" v="90" actId="20577"/>
+          <ac:spMkLst>
+            <pc:docMk/>
+            <pc:sldMk cId="1192821646" sldId="259"/>
+            <ac:spMk id="3" creationId="{7550A704-59C6-4D51-AB6F-0FBF030ED35C}"/>
+          </ac:spMkLst>
+        </pc:spChg>
+      </pc:sldChg>
+      <pc:sldChg chg="add del">
+        <pc:chgData name="Wriju Ghosh" userId="93330360-ec5c-4afd-b5e4-d283febfe7a2" providerId="ADAL" clId="{FED53AF1-3644-4234-9F3E-BD821256C930}" dt="2021-04-13T10:00:58.475" v="41" actId="22"/>
+        <pc:sldMkLst>
+          <pc:docMk/>
+          <pc:sldMk cId="3468911711" sldId="259"/>
+        </pc:sldMkLst>
       </pc:sldChg>
     </pc:docChg>
   </pc:docChgLst>
@@ -308,7 +374,7 @@
           <a:p>
             <a:fld id="{824E1A4C-B976-480D-8C3B-EF40278CB13A}" type="datetimeFigureOut">
               <a:rPr lang="en-US" smtClean="0"/>
-              <a:t>4/12/2021</a:t>
+              <a:t>4/13/2021</a:t>
             </a:fld>
             <a:endParaRPr lang="en-US"/>
           </a:p>
@@ -506,7 +572,7 @@
           <a:p>
             <a:fld id="{824E1A4C-B976-480D-8C3B-EF40278CB13A}" type="datetimeFigureOut">
               <a:rPr lang="en-US" smtClean="0"/>
-              <a:t>4/12/2021</a:t>
+              <a:t>4/13/2021</a:t>
             </a:fld>
             <a:endParaRPr lang="en-US"/>
           </a:p>
@@ -714,7 +780,7 @@
           <a:p>
             <a:fld id="{824E1A4C-B976-480D-8C3B-EF40278CB13A}" type="datetimeFigureOut">
               <a:rPr lang="en-US" smtClean="0"/>
-              <a:t>4/12/2021</a:t>
+              <a:t>4/13/2021</a:t>
             </a:fld>
             <a:endParaRPr lang="en-US"/>
           </a:p>
@@ -912,7 +978,7 @@
           <a:p>
             <a:fld id="{824E1A4C-B976-480D-8C3B-EF40278CB13A}" type="datetimeFigureOut">
               <a:rPr lang="en-US" smtClean="0"/>
-              <a:t>4/12/2021</a:t>
+              <a:t>4/13/2021</a:t>
             </a:fld>
             <a:endParaRPr lang="en-US"/>
           </a:p>
@@ -1187,7 +1253,7 @@
           <a:p>
             <a:fld id="{824E1A4C-B976-480D-8C3B-EF40278CB13A}" type="datetimeFigureOut">
               <a:rPr lang="en-US" smtClean="0"/>
-              <a:t>4/12/2021</a:t>
+              <a:t>4/13/2021</a:t>
             </a:fld>
             <a:endParaRPr lang="en-US"/>
           </a:p>
@@ -1452,7 +1518,7 @@
           <a:p>
             <a:fld id="{824E1A4C-B976-480D-8C3B-EF40278CB13A}" type="datetimeFigureOut">
               <a:rPr lang="en-US" smtClean="0"/>
-              <a:t>4/12/2021</a:t>
+              <a:t>4/13/2021</a:t>
             </a:fld>
             <a:endParaRPr lang="en-US"/>
           </a:p>
@@ -1864,7 +1930,7 @@
           <a:p>
             <a:fld id="{824E1A4C-B976-480D-8C3B-EF40278CB13A}" type="datetimeFigureOut">
               <a:rPr lang="en-US" smtClean="0"/>
-              <a:t>4/12/2021</a:t>
+              <a:t>4/13/2021</a:t>
             </a:fld>
             <a:endParaRPr lang="en-US"/>
           </a:p>
@@ -2005,7 +2071,7 @@
           <a:p>
             <a:fld id="{824E1A4C-B976-480D-8C3B-EF40278CB13A}" type="datetimeFigureOut">
               <a:rPr lang="en-US" smtClean="0"/>
-              <a:t>4/12/2021</a:t>
+              <a:t>4/13/2021</a:t>
             </a:fld>
             <a:endParaRPr lang="en-US"/>
           </a:p>
@@ -2118,7 +2184,7 @@
           <a:p>
             <a:fld id="{824E1A4C-B976-480D-8C3B-EF40278CB13A}" type="datetimeFigureOut">
               <a:rPr lang="en-US" smtClean="0"/>
-              <a:t>4/12/2021</a:t>
+              <a:t>4/13/2021</a:t>
             </a:fld>
             <a:endParaRPr lang="en-US"/>
           </a:p>
@@ -2429,7 +2495,7 @@
           <a:p>
             <a:fld id="{824E1A4C-B976-480D-8C3B-EF40278CB13A}" type="datetimeFigureOut">
               <a:rPr lang="en-US" smtClean="0"/>
-              <a:t>4/12/2021</a:t>
+              <a:t>4/13/2021</a:t>
             </a:fld>
             <a:endParaRPr lang="en-US"/>
           </a:p>
@@ -2717,7 +2783,7 @@
           <a:p>
             <a:fld id="{824E1A4C-B976-480D-8C3B-EF40278CB13A}" type="datetimeFigureOut">
               <a:rPr lang="en-US" smtClean="0"/>
-              <a:t>4/12/2021</a:t>
+              <a:t>4/13/2021</a:t>
             </a:fld>
             <a:endParaRPr lang="en-US"/>
           </a:p>
@@ -2958,7 +3024,7 @@
           <a:p>
             <a:fld id="{824E1A4C-B976-480D-8C3B-EF40278CB13A}" type="datetimeFigureOut">
               <a:rPr lang="en-US" smtClean="0"/>
-              <a:t>4/12/2021</a:t>
+              <a:t>4/13/2021</a:t>
             </a:fld>
             <a:endParaRPr lang="en-US"/>
           </a:p>
@@ -3855,7 +3921,10 @@
           <a:bodyPr/>
           <a:lstStyle/>
           <a:p>
-            <a:endParaRPr lang="en-US" dirty="0"/>
+            <a:r>
+              <a:rPr lang="en-US" dirty="0"/>
+              <a:t>Steps</a:t>
+            </a:r>
           </a:p>
         </p:txBody>
       </p:sp>
@@ -3880,7 +3949,34 @@
           <a:bodyPr/>
           <a:lstStyle/>
           <a:p>
-            <a:endParaRPr lang="en-US"/>
+            <a:r>
+              <a:rPr lang="en-US" dirty="0"/>
+              <a:t>Connect VS Code </a:t>
+            </a:r>
+          </a:p>
+          <a:p>
+            <a:r>
+              <a:rPr lang="en-US" dirty="0"/>
+              <a:t>Create ASP.net Core apps and Containerize</a:t>
+            </a:r>
+          </a:p>
+          <a:p>
+            <a:r>
+              <a:rPr lang="en-US" dirty="0"/>
+              <a:t>Push it to Docker Hub / ACR</a:t>
+            </a:r>
+          </a:p>
+          <a:p>
+            <a:r>
+              <a:rPr lang="en-US" dirty="0"/>
+              <a:t>Host it in ACI</a:t>
+            </a:r>
+          </a:p>
+          <a:p>
+            <a:r>
+              <a:rPr lang="en-US" dirty="0"/>
+              <a:t>Finally to AKS</a:t>
+            </a:r>
           </a:p>
         </p:txBody>
       </p:sp>
@@ -3894,6 +3990,284 @@
   <p:clrMapOvr>
     <a:masterClrMapping/>
   </p:clrMapOvr>
+  <p:timing>
+    <p:tnLst>
+      <p:par>
+        <p:cTn id="1" dur="indefinite" restart="never" nodeType="tmRoot">
+          <p:childTnLst>
+            <p:seq concurrent="1" nextAc="seek">
+              <p:cTn id="2" dur="indefinite" nodeType="mainSeq">
+                <p:childTnLst>
+                  <p:par>
+                    <p:cTn id="3" fill="hold">
+                      <p:stCondLst>
+                        <p:cond delay="indefinite"/>
+                      </p:stCondLst>
+                      <p:childTnLst>
+                        <p:par>
+                          <p:cTn id="4" fill="hold">
+                            <p:stCondLst>
+                              <p:cond delay="0"/>
+                            </p:stCondLst>
+                            <p:childTnLst>
+                              <p:par>
+                                <p:cTn id="5" presetID="1" presetClass="entr" presetSubtype="0" fill="hold" grpId="0" nodeType="clickEffect">
+                                  <p:stCondLst>
+                                    <p:cond delay="0"/>
+                                  </p:stCondLst>
+                                  <p:childTnLst>
+                                    <p:set>
+                                      <p:cBhvr>
+                                        <p:cTn id="6" dur="1" fill="hold">
+                                          <p:stCondLst>
+                                            <p:cond delay="0"/>
+                                          </p:stCondLst>
+                                        </p:cTn>
+                                        <p:tgtEl>
+                                          <p:spTgt spid="3">
+                                            <p:txEl>
+                                              <p:pRg st="0" end="0"/>
+                                            </p:txEl>
+                                          </p:spTgt>
+                                        </p:tgtEl>
+                                        <p:attrNameLst>
+                                          <p:attrName>style.visibility</p:attrName>
+                                        </p:attrNameLst>
+                                      </p:cBhvr>
+                                      <p:to>
+                                        <p:strVal val="visible"/>
+                                      </p:to>
+                                    </p:set>
+                                  </p:childTnLst>
+                                </p:cTn>
+                              </p:par>
+                            </p:childTnLst>
+                          </p:cTn>
+                        </p:par>
+                      </p:childTnLst>
+                    </p:cTn>
+                  </p:par>
+                  <p:par>
+                    <p:cTn id="7" fill="hold">
+                      <p:stCondLst>
+                        <p:cond delay="indefinite"/>
+                      </p:stCondLst>
+                      <p:childTnLst>
+                        <p:par>
+                          <p:cTn id="8" fill="hold">
+                            <p:stCondLst>
+                              <p:cond delay="0"/>
+                            </p:stCondLst>
+                            <p:childTnLst>
+                              <p:par>
+                                <p:cTn id="9" presetID="1" presetClass="entr" presetSubtype="0" fill="hold" grpId="0" nodeType="clickEffect">
+                                  <p:stCondLst>
+                                    <p:cond delay="0"/>
+                                  </p:stCondLst>
+                                  <p:childTnLst>
+                                    <p:set>
+                                      <p:cBhvr>
+                                        <p:cTn id="10" dur="1" fill="hold">
+                                          <p:stCondLst>
+                                            <p:cond delay="0"/>
+                                          </p:stCondLst>
+                                        </p:cTn>
+                                        <p:tgtEl>
+                                          <p:spTgt spid="3">
+                                            <p:txEl>
+                                              <p:pRg st="1" end="1"/>
+                                            </p:txEl>
+                                          </p:spTgt>
+                                        </p:tgtEl>
+                                        <p:attrNameLst>
+                                          <p:attrName>style.visibility</p:attrName>
+                                        </p:attrNameLst>
+                                      </p:cBhvr>
+                                      <p:to>
+                                        <p:strVal val="visible"/>
+                                      </p:to>
+                                    </p:set>
+                                  </p:childTnLst>
+                                </p:cTn>
+                              </p:par>
+                            </p:childTnLst>
+                          </p:cTn>
+                        </p:par>
+                      </p:childTnLst>
+                    </p:cTn>
+                  </p:par>
+                  <p:par>
+                    <p:cTn id="11" fill="hold">
+                      <p:stCondLst>
+                        <p:cond delay="indefinite"/>
+                      </p:stCondLst>
+                      <p:childTnLst>
+                        <p:par>
+                          <p:cTn id="12" fill="hold">
+                            <p:stCondLst>
+                              <p:cond delay="0"/>
+                            </p:stCondLst>
+                            <p:childTnLst>
+                              <p:par>
+                                <p:cTn id="13" presetID="1" presetClass="entr" presetSubtype="0" fill="hold" grpId="0" nodeType="clickEffect">
+                                  <p:stCondLst>
+                                    <p:cond delay="0"/>
+                                  </p:stCondLst>
+                                  <p:childTnLst>
+                                    <p:set>
+                                      <p:cBhvr>
+                                        <p:cTn id="14" dur="1" fill="hold">
+                                          <p:stCondLst>
+                                            <p:cond delay="0"/>
+                                          </p:stCondLst>
+                                        </p:cTn>
+                                        <p:tgtEl>
+                                          <p:spTgt spid="3">
+                                            <p:txEl>
+                                              <p:pRg st="2" end="2"/>
+                                            </p:txEl>
+                                          </p:spTgt>
+                                        </p:tgtEl>
+                                        <p:attrNameLst>
+                                          <p:attrName>style.visibility</p:attrName>
+                                        </p:attrNameLst>
+                                      </p:cBhvr>
+                                      <p:to>
+                                        <p:strVal val="visible"/>
+                                      </p:to>
+                                    </p:set>
+                                  </p:childTnLst>
+                                </p:cTn>
+                              </p:par>
+                            </p:childTnLst>
+                          </p:cTn>
+                        </p:par>
+                      </p:childTnLst>
+                    </p:cTn>
+                  </p:par>
+                  <p:par>
+                    <p:cTn id="15" fill="hold">
+                      <p:stCondLst>
+                        <p:cond delay="indefinite"/>
+                      </p:stCondLst>
+                      <p:childTnLst>
+                        <p:par>
+                          <p:cTn id="16" fill="hold">
+                            <p:stCondLst>
+                              <p:cond delay="0"/>
+                            </p:stCondLst>
+                            <p:childTnLst>
+                              <p:par>
+                                <p:cTn id="17" presetID="1" presetClass="entr" presetSubtype="0" fill="hold" grpId="0" nodeType="clickEffect">
+                                  <p:stCondLst>
+                                    <p:cond delay="0"/>
+                                  </p:stCondLst>
+                                  <p:childTnLst>
+                                    <p:set>
+                                      <p:cBhvr>
+                                        <p:cTn id="18" dur="1" fill="hold">
+                                          <p:stCondLst>
+                                            <p:cond delay="0"/>
+                                          </p:stCondLst>
+                                        </p:cTn>
+                                        <p:tgtEl>
+                                          <p:spTgt spid="3">
+                                            <p:txEl>
+                                              <p:pRg st="3" end="3"/>
+                                            </p:txEl>
+                                          </p:spTgt>
+                                        </p:tgtEl>
+                                        <p:attrNameLst>
+                                          <p:attrName>style.visibility</p:attrName>
+                                        </p:attrNameLst>
+                                      </p:cBhvr>
+                                      <p:to>
+                                        <p:strVal val="visible"/>
+                                      </p:to>
+                                    </p:set>
+                                  </p:childTnLst>
+                                </p:cTn>
+                              </p:par>
+                            </p:childTnLst>
+                          </p:cTn>
+                        </p:par>
+                      </p:childTnLst>
+                    </p:cTn>
+                  </p:par>
+                  <p:par>
+                    <p:cTn id="19" fill="hold">
+                      <p:stCondLst>
+                        <p:cond delay="indefinite"/>
+                      </p:stCondLst>
+                      <p:childTnLst>
+                        <p:par>
+                          <p:cTn id="20" fill="hold">
+                            <p:stCondLst>
+                              <p:cond delay="0"/>
+                            </p:stCondLst>
+                            <p:childTnLst>
+                              <p:par>
+                                <p:cTn id="21" presetID="1" presetClass="entr" presetSubtype="0" fill="hold" grpId="0" nodeType="clickEffect">
+                                  <p:stCondLst>
+                                    <p:cond delay="0"/>
+                                  </p:stCondLst>
+                                  <p:childTnLst>
+                                    <p:set>
+                                      <p:cBhvr>
+                                        <p:cTn id="22" dur="1" fill="hold">
+                                          <p:stCondLst>
+                                            <p:cond delay="0"/>
+                                          </p:stCondLst>
+                                        </p:cTn>
+                                        <p:tgtEl>
+                                          <p:spTgt spid="3">
+                                            <p:txEl>
+                                              <p:pRg st="4" end="4"/>
+                                            </p:txEl>
+                                          </p:spTgt>
+                                        </p:tgtEl>
+                                        <p:attrNameLst>
+                                          <p:attrName>style.visibility</p:attrName>
+                                        </p:attrNameLst>
+                                      </p:cBhvr>
+                                      <p:to>
+                                        <p:strVal val="visible"/>
+                                      </p:to>
+                                    </p:set>
+                                  </p:childTnLst>
+                                </p:cTn>
+                              </p:par>
+                            </p:childTnLst>
+                          </p:cTn>
+                        </p:par>
+                      </p:childTnLst>
+                    </p:cTn>
+                  </p:par>
+                </p:childTnLst>
+              </p:cTn>
+              <p:prevCondLst>
+                <p:cond evt="onPrev" delay="0">
+                  <p:tgtEl>
+                    <p:sldTgt/>
+                  </p:tgtEl>
+                </p:cond>
+              </p:prevCondLst>
+              <p:nextCondLst>
+                <p:cond evt="onNext" delay="0">
+                  <p:tgtEl>
+                    <p:sldTgt/>
+                  </p:tgtEl>
+                </p:cond>
+              </p:nextCondLst>
+            </p:seq>
+          </p:childTnLst>
+        </p:cTn>
+      </p:par>
+    </p:tnLst>
+    <p:bldLst>
+      <p:bldP spid="3" grpId="0" build="p"/>
+    </p:bldLst>
+  </p:timing>
 </p:sld>
 </file>
 
@@ -3965,25 +4339,54 @@
           <a:p>
             <a:r>
               <a:rPr lang="en-US" dirty="0"/>
-              <a:t>Code </a:t>
-            </a:r>
-            <a:r>
-              <a:rPr lang="en-US"/>
-              <a:t>and Scripts </a:t>
-            </a:r>
-            <a:r>
-              <a:rPr lang="en-US">
+              <a:t>Code and Scripts </a:t>
+            </a:r>
+            <a:r>
+              <a:rPr lang="en-US" dirty="0">
                 <a:hlinkClick r:id="rId2"/>
               </a:rPr>
-              <a:t>https://github.com/wrijugh/AzureGlobalBootcamp2021-Wriju-Demo</a:t>
-            </a:r>
-            <a:r>
-              <a:rPr lang="en-US"/>
+              <a:t>https://github.com/wrijugh/GA2021-Wriju-Demo</a:t>
+            </a:r>
+            <a:endParaRPr lang="en-US" dirty="0"/>
+          </a:p>
+          <a:p>
+            <a:endParaRPr lang="en-US" dirty="0"/>
+          </a:p>
+          <a:p>
+            <a:r>
+              <a:rPr lang="en-US"/>
+              <a:t>Page </a:t>
+            </a:r>
+            <a:r>
+              <a:rPr lang="en-US" b="0">
+                <a:solidFill>
+                  <a:srgbClr val="000000"/>
+                </a:solidFill>
+                <a:effectLst/>
+                <a:latin typeface="Consolas" panose="020B0609020204030204" pitchFamily="49" charset="0"/>
+                <a:hlinkClick r:id="rId3"/>
+              </a:rPr>
+              <a:t>https://wrijugh.github.io/GA2021-Wriju-Demo/</a:t>
+            </a:r>
+            <a:r>
+              <a:rPr lang="en-US" b="0">
+                <a:solidFill>
+                  <a:srgbClr val="000000"/>
+                </a:solidFill>
+                <a:effectLst/>
+                <a:latin typeface="Consolas" panose="020B0609020204030204" pitchFamily="49" charset="0"/>
+              </a:rPr>
               <a:t> </a:t>
             </a:r>
           </a:p>
           <a:p>
-            <a:endParaRPr lang="en-US"/>
+            <a:endParaRPr lang="en-US" dirty="0"/>
+          </a:p>
+          <a:p>
+            <a:endParaRPr lang="en-US" dirty="0"/>
+          </a:p>
+          <a:p>
+            <a:endParaRPr lang="en-US" dirty="0"/>
           </a:p>
           <a:p>
             <a:endParaRPr lang="en-US" dirty="0"/>

</xml_diff>